<commit_message>
Adapted class diagramm to DTD
</commit_message>
<xml_diff>
--- a/mancala/3_xslt/Klassendiagramm.pptx
+++ b/mancala/3_xslt/Klassendiagramm.pptx
@@ -192,7 +192,7 @@
           <a:p>
             <a:fld id="{DA9283EB-60A6-4B7E-A2EF-5A1C89B58859}" type="datetimeFigureOut">
               <a:rPr lang="de-DE" smtClean="0"/>
-              <a:t>06.05.2016</a:t>
+              <a:t>10.05.2016</a:t>
             </a:fld>
             <a:endParaRPr lang="de-DE"/>
           </a:p>
@@ -641,7 +641,7 @@
           <a:p>
             <a:fld id="{89EC5A37-9DBB-4196-AC94-BF7F6C2BA01E}" type="datetimeFigureOut">
               <a:rPr lang="de-DE" smtClean="0"/>
-              <a:t>06.05.2016</a:t>
+              <a:t>10.05.2016</a:t>
             </a:fld>
             <a:endParaRPr lang="de-DE"/>
           </a:p>
@@ -811,7 +811,7 @@
           <a:p>
             <a:fld id="{89EC5A37-9DBB-4196-AC94-BF7F6C2BA01E}" type="datetimeFigureOut">
               <a:rPr lang="de-DE" smtClean="0"/>
-              <a:t>06.05.2016</a:t>
+              <a:t>10.05.2016</a:t>
             </a:fld>
             <a:endParaRPr lang="de-DE"/>
           </a:p>
@@ -991,7 +991,7 @@
           <a:p>
             <a:fld id="{89EC5A37-9DBB-4196-AC94-BF7F6C2BA01E}" type="datetimeFigureOut">
               <a:rPr lang="de-DE" smtClean="0"/>
-              <a:t>06.05.2016</a:t>
+              <a:t>10.05.2016</a:t>
             </a:fld>
             <a:endParaRPr lang="de-DE"/>
           </a:p>
@@ -1161,7 +1161,7 @@
           <a:p>
             <a:fld id="{89EC5A37-9DBB-4196-AC94-BF7F6C2BA01E}" type="datetimeFigureOut">
               <a:rPr lang="de-DE" smtClean="0"/>
-              <a:t>06.05.2016</a:t>
+              <a:t>10.05.2016</a:t>
             </a:fld>
             <a:endParaRPr lang="de-DE"/>
           </a:p>
@@ -1407,7 +1407,7 @@
           <a:p>
             <a:fld id="{89EC5A37-9DBB-4196-AC94-BF7F6C2BA01E}" type="datetimeFigureOut">
               <a:rPr lang="de-DE" smtClean="0"/>
-              <a:t>06.05.2016</a:t>
+              <a:t>10.05.2016</a:t>
             </a:fld>
             <a:endParaRPr lang="de-DE"/>
           </a:p>
@@ -1695,7 +1695,7 @@
           <a:p>
             <a:fld id="{89EC5A37-9DBB-4196-AC94-BF7F6C2BA01E}" type="datetimeFigureOut">
               <a:rPr lang="de-DE" smtClean="0"/>
-              <a:t>06.05.2016</a:t>
+              <a:t>10.05.2016</a:t>
             </a:fld>
             <a:endParaRPr lang="de-DE"/>
           </a:p>
@@ -2117,7 +2117,7 @@
           <a:p>
             <a:fld id="{89EC5A37-9DBB-4196-AC94-BF7F6C2BA01E}" type="datetimeFigureOut">
               <a:rPr lang="de-DE" smtClean="0"/>
-              <a:t>06.05.2016</a:t>
+              <a:t>10.05.2016</a:t>
             </a:fld>
             <a:endParaRPr lang="de-DE"/>
           </a:p>
@@ -2235,7 +2235,7 @@
           <a:p>
             <a:fld id="{89EC5A37-9DBB-4196-AC94-BF7F6C2BA01E}" type="datetimeFigureOut">
               <a:rPr lang="de-DE" smtClean="0"/>
-              <a:t>06.05.2016</a:t>
+              <a:t>10.05.2016</a:t>
             </a:fld>
             <a:endParaRPr lang="de-DE"/>
           </a:p>
@@ -2330,7 +2330,7 @@
           <a:p>
             <a:fld id="{89EC5A37-9DBB-4196-AC94-BF7F6C2BA01E}" type="datetimeFigureOut">
               <a:rPr lang="de-DE" smtClean="0"/>
-              <a:t>06.05.2016</a:t>
+              <a:t>10.05.2016</a:t>
             </a:fld>
             <a:endParaRPr lang="de-DE"/>
           </a:p>
@@ -2607,7 +2607,7 @@
           <a:p>
             <a:fld id="{89EC5A37-9DBB-4196-AC94-BF7F6C2BA01E}" type="datetimeFigureOut">
               <a:rPr lang="de-DE" smtClean="0"/>
-              <a:t>06.05.2016</a:t>
+              <a:t>10.05.2016</a:t>
             </a:fld>
             <a:endParaRPr lang="de-DE"/>
           </a:p>
@@ -2860,7 +2860,7 @@
           <a:p>
             <a:fld id="{89EC5A37-9DBB-4196-AC94-BF7F6C2BA01E}" type="datetimeFigureOut">
               <a:rPr lang="de-DE" smtClean="0"/>
-              <a:t>06.05.2016</a:t>
+              <a:t>10.05.2016</a:t>
             </a:fld>
             <a:endParaRPr lang="de-DE"/>
           </a:p>
@@ -3073,7 +3073,7 @@
           <a:p>
             <a:fld id="{89EC5A37-9DBB-4196-AC94-BF7F6C2BA01E}" type="datetimeFigureOut">
               <a:rPr lang="de-DE" smtClean="0"/>
-              <a:t>06.05.2016</a:t>
+              <a:t>10.05.2016</a:t>
             </a:fld>
             <a:endParaRPr lang="de-DE"/>
           </a:p>
@@ -3456,8 +3456,8 @@
         </p:nvSpPr>
         <p:spPr>
           <a:xfrm>
-            <a:off x="1331640" y="764704"/>
-            <a:ext cx="2520280" cy="2031325"/>
+            <a:off x="2100230" y="2204864"/>
+            <a:ext cx="2520280" cy="1754326"/>
           </a:xfrm>
           <a:prstGeom prst="rect">
             <a:avLst/>
@@ -3477,8 +3477,9 @@
           <a:p>
             <a:r>
               <a:rPr lang="de-DE" dirty="0" smtClean="0"/>
-              <a:t>Spieler</a:t>
-            </a:r>
+              <a:t>Player</a:t>
+            </a:r>
+            <a:endParaRPr lang="de-DE" dirty="0" smtClean="0"/>
           </a:p>
           <a:p>
             <a:r>
@@ -3499,8 +3500,16 @@
           </a:p>
           <a:p>
             <a:r>
+              <a:rPr lang="de-DE" dirty="0" err="1" smtClean="0"/>
+              <a:t>WinCount</a:t>
+            </a:r>
+            <a:r>
               <a:rPr lang="de-DE" dirty="0" smtClean="0"/>
-              <a:t>#Gewinne : </a:t>
+              <a:t> </a:t>
+            </a:r>
+            <a:r>
+              <a:rPr lang="de-DE" dirty="0" smtClean="0"/>
+              <a:t>: </a:t>
             </a:r>
             <a:r>
               <a:rPr lang="de-DE" dirty="0" err="1" smtClean="0"/>
@@ -3511,22 +3520,11 @@
           <a:p>
             <a:r>
               <a:rPr lang="de-DE" dirty="0" err="1" smtClean="0"/>
-              <a:t>IstAmZug</a:t>
+              <a:t>SeedCount</a:t>
             </a:r>
             <a:r>
               <a:rPr lang="de-DE" dirty="0" smtClean="0"/>
               <a:t> : </a:t>
-            </a:r>
-            <a:r>
-              <a:rPr lang="de-DE" dirty="0" err="1" smtClean="0"/>
-              <a:t>bool</a:t>
-            </a:r>
-            <a:endParaRPr lang="de-DE" dirty="0" smtClean="0"/>
-          </a:p>
-          <a:p>
-            <a:r>
-              <a:rPr lang="de-DE" dirty="0" smtClean="0"/>
-              <a:t>#Steine : </a:t>
             </a:r>
             <a:r>
               <a:rPr lang="de-DE" dirty="0" err="1" smtClean="0"/>
@@ -3555,7 +3553,7 @@
         </p:nvSpPr>
         <p:spPr>
           <a:xfrm>
-            <a:off x="5389100" y="1767891"/>
+            <a:off x="6157690" y="2992027"/>
             <a:ext cx="2711292" cy="1200329"/>
           </a:xfrm>
           <a:prstGeom prst="rect">
@@ -3587,21 +3585,24 @@
           </a:p>
           <a:p>
             <a:r>
+              <a:rPr lang="de-DE" dirty="0" err="1" smtClean="0"/>
+              <a:t>Kalaha</a:t>
+            </a:r>
+            <a:r>
               <a:rPr lang="de-DE" dirty="0" smtClean="0"/>
-              <a:t>Hauptmulde : Mulde</a:t>
-            </a:r>
-          </a:p>
-          <a:p>
-            <a:r>
-              <a:rPr lang="de-DE" dirty="0" smtClean="0">
-                <a:solidFill>
-                  <a:schemeClr val="bg1">
-                    <a:lumMod val="75000"/>
-                  </a:schemeClr>
-                </a:solidFill>
-              </a:rPr>
-              <a:t>(Spielmulden List&lt;Mulde&gt;)</a:t>
-            </a:r>
+              <a:t> : </a:t>
+            </a:r>
+            <a:r>
+              <a:rPr lang="de-DE" dirty="0" smtClean="0"/>
+              <a:t>Mulde</a:t>
+            </a:r>
+          </a:p>
+          <a:p>
+            <a:r>
+              <a:rPr lang="de-DE" dirty="0" smtClean="0"/>
+              <a:t>House : Mulde x6</a:t>
+            </a:r>
+            <a:endParaRPr lang="de-DE" dirty="0" smtClean="0"/>
           </a:p>
         </p:txBody>
       </p:sp>
@@ -3613,8 +3614,8 @@
         </p:nvSpPr>
         <p:spPr>
           <a:xfrm>
-            <a:off x="5596236" y="4123064"/>
-            <a:ext cx="2520280" cy="1200329"/>
+            <a:off x="6364826" y="5347200"/>
+            <a:ext cx="2520280" cy="923330"/>
           </a:xfrm>
           <a:prstGeom prst="rect">
             <a:avLst/>
@@ -3645,21 +3646,18 @@
           </a:p>
           <a:p>
             <a:r>
+              <a:rPr lang="de-DE" dirty="0" err="1" smtClean="0"/>
+              <a:t>SeedCount</a:t>
+            </a:r>
+            <a:r>
               <a:rPr lang="de-DE" dirty="0" smtClean="0"/>
-              <a:t>#Steine : </a:t>
+              <a:t> : </a:t>
             </a:r>
             <a:r>
               <a:rPr lang="de-DE" dirty="0" err="1" smtClean="0"/>
               <a:t>int</a:t>
             </a:r>
             <a:endParaRPr lang="de-DE" dirty="0" smtClean="0"/>
-          </a:p>
-          <a:p>
-            <a:r>
-              <a:rPr lang="de-DE" dirty="0" smtClean="0"/>
-              <a:t>Nachfolger : Mulde</a:t>
-            </a:r>
-            <a:endParaRPr lang="de-DE" dirty="0"/>
           </a:p>
         </p:txBody>
       </p:sp>
@@ -3671,7 +3669,7 @@
         </p:nvCxnSpPr>
         <p:spPr>
           <a:xfrm>
-            <a:off x="3851920" y="2636912"/>
+            <a:off x="4620510" y="3861048"/>
             <a:ext cx="1537180" cy="0"/>
           </a:xfrm>
           <a:prstGeom prst="line">
@@ -3706,7 +3704,7 @@
         </p:nvCxnSpPr>
         <p:spPr>
           <a:xfrm flipV="1">
-            <a:off x="6588224" y="2968220"/>
+            <a:off x="7356814" y="4192356"/>
             <a:ext cx="0" cy="1154844"/>
           </a:xfrm>
           <a:prstGeom prst="line">
@@ -3735,19 +3733,24 @@
       </p:cxnSp>
       <p:sp>
         <p:nvSpPr>
-          <p:cNvPr id="13" name="Textfeld 12"/>
+          <p:cNvPr id="9" name="Textfeld 8"/>
           <p:cNvSpPr txBox="1"/>
           <p:nvPr/>
         </p:nvSpPr>
         <p:spPr>
           <a:xfrm>
-            <a:off x="5073616" y="2204864"/>
-            <a:ext cx="1728192" cy="369332"/>
+            <a:off x="539552" y="476672"/>
+            <a:ext cx="2520280" cy="1200329"/>
           </a:xfrm>
           <a:prstGeom prst="rect">
             <a:avLst/>
           </a:prstGeom>
           <a:noFill/>
+          <a:ln>
+            <a:solidFill>
+              <a:schemeClr val="tx1"/>
+            </a:solidFill>
+          </a:ln>
         </p:spPr>
         <p:txBody>
           <a:bodyPr wrap="square" rtlCol="0">
@@ -3756,43 +3759,72 @@
           <a:lstStyle/>
           <a:p>
             <a:r>
+              <a:rPr lang="de-DE" dirty="0" err="1" smtClean="0"/>
+              <a:t>MancalaGame</a:t>
+            </a:r>
+            <a:endParaRPr lang="de-DE" dirty="0" smtClean="0"/>
+          </a:p>
+          <a:p>
+            <a:r>
               <a:rPr lang="de-DE" dirty="0" smtClean="0"/>
-              <a:t>1</a:t>
+              <a:t>____________________</a:t>
+            </a:r>
+          </a:p>
+          <a:p>
+            <a:r>
+              <a:rPr lang="de-DE" dirty="0" smtClean="0"/>
+              <a:t>Player1 </a:t>
+            </a:r>
+            <a:r>
+              <a:rPr lang="de-DE" dirty="0" smtClean="0"/>
+              <a:t>: Player</a:t>
+            </a:r>
+            <a:endParaRPr lang="de-DE" dirty="0" smtClean="0"/>
+          </a:p>
+          <a:p>
+            <a:r>
+              <a:rPr lang="de-DE" dirty="0" smtClean="0"/>
+              <a:t>Player 2 : Player</a:t>
             </a:r>
             <a:endParaRPr lang="de-DE" dirty="0"/>
           </a:p>
         </p:txBody>
       </p:sp>
-      <p:sp>
-        <p:nvSpPr>
-          <p:cNvPr id="14" name="Textfeld 13"/>
-          <p:cNvSpPr txBox="1"/>
+      <p:cxnSp>
+        <p:nvCxnSpPr>
+          <p:cNvPr id="11" name="Gerade Verbindung 10"/>
+          <p:cNvCxnSpPr/>
           <p:nvPr/>
-        </p:nvSpPr>
+        </p:nvCxnSpPr>
         <p:spPr>
-          <a:xfrm>
-            <a:off x="6711935" y="3696410"/>
-            <a:ext cx="936104" cy="369332"/>
+          <a:xfrm flipV="1">
+            <a:off x="2915816" y="1677001"/>
+            <a:ext cx="0" cy="527863"/>
           </a:xfrm>
-          <a:prstGeom prst="rect">
+          <a:prstGeom prst="line">
             <a:avLst/>
           </a:prstGeom>
-          <a:noFill/>
+          <a:ln>
+            <a:solidFill>
+              <a:schemeClr val="tx1"/>
+            </a:solidFill>
+          </a:ln>
         </p:spPr>
-        <p:txBody>
-          <a:bodyPr wrap="square" rtlCol="0">
-            <a:spAutoFit/>
-          </a:bodyPr>
-          <a:lstStyle/>
-          <a:p>
-            <a:r>
-              <a:rPr lang="de-DE" dirty="0" smtClean="0"/>
-              <a:t>1 .. n</a:t>
-            </a:r>
-            <a:endParaRPr lang="de-DE" dirty="0"/>
-          </a:p>
-        </p:txBody>
-      </p:sp>
+        <p:style>
+          <a:lnRef idx="1">
+            <a:schemeClr val="accent1"/>
+          </a:lnRef>
+          <a:fillRef idx="0">
+            <a:schemeClr val="accent1"/>
+          </a:fillRef>
+          <a:effectRef idx="0">
+            <a:schemeClr val="accent1"/>
+          </a:effectRef>
+          <a:fontRef idx="minor">
+            <a:schemeClr val="tx1"/>
+          </a:fontRef>
+        </p:style>
+      </p:cxnSp>
     </p:spTree>
     <p:extLst>
       <p:ext uri="{BB962C8B-B14F-4D97-AF65-F5344CB8AC3E}">

</xml_diff>